<commit_message>
update hr_v2 and note for theory knowledge
</commit_message>
<xml_diff>
--- a/HR_analytics/Presentation/HR.pptx
+++ b/HR_analytics/Presentation/HR.pptx
@@ -5,45 +5,44 @@
     <p:sldMasterId id="2147483659" r:id="rId1"/>
   </p:sldMasterIdLst>
   <p:notesMasterIdLst>
-    <p:notesMasterId r:id="rId14"/>
+    <p:notesMasterId r:id="rId13"/>
   </p:notesMasterIdLst>
   <p:sldIdLst>
     <p:sldId id="256" r:id="rId2"/>
     <p:sldId id="257" r:id="rId3"/>
     <p:sldId id="278" r:id="rId4"/>
     <p:sldId id="277" r:id="rId5"/>
-    <p:sldId id="279" r:id="rId6"/>
-    <p:sldId id="280" r:id="rId7"/>
-    <p:sldId id="281" r:id="rId8"/>
-    <p:sldId id="282" r:id="rId9"/>
-    <p:sldId id="283" r:id="rId10"/>
-    <p:sldId id="284" r:id="rId11"/>
-    <p:sldId id="285" r:id="rId12"/>
-    <p:sldId id="276" r:id="rId13"/>
+    <p:sldId id="281" r:id="rId6"/>
+    <p:sldId id="282" r:id="rId7"/>
+    <p:sldId id="283" r:id="rId8"/>
+    <p:sldId id="284" r:id="rId9"/>
+    <p:sldId id="286" r:id="rId10"/>
+    <p:sldId id="285" r:id="rId11"/>
+    <p:sldId id="276" r:id="rId12"/>
   </p:sldIdLst>
   <p:sldSz cx="9144000" cy="5143500" type="screen16x9"/>
   <p:notesSz cx="6858000" cy="9144000"/>
   <p:embeddedFontLst>
     <p:embeddedFont>
       <p:font typeface="Lato" panose="020F0502020204030203" pitchFamily="34" charset="0"/>
-      <p:regular r:id="rId15"/>
-      <p:bold r:id="rId16"/>
-      <p:italic r:id="rId17"/>
-      <p:boldItalic r:id="rId18"/>
+      <p:regular r:id="rId14"/>
+      <p:bold r:id="rId15"/>
+      <p:italic r:id="rId16"/>
+      <p:boldItalic r:id="rId17"/>
     </p:embeddedFont>
     <p:embeddedFont>
       <p:font typeface="Montserrat" panose="00000500000000000000" pitchFamily="2" charset="0"/>
-      <p:regular r:id="rId19"/>
-      <p:bold r:id="rId20"/>
-      <p:italic r:id="rId21"/>
-      <p:boldItalic r:id="rId22"/>
+      <p:regular r:id="rId18"/>
+      <p:bold r:id="rId19"/>
+      <p:italic r:id="rId20"/>
+      <p:boldItalic r:id="rId21"/>
     </p:embeddedFont>
     <p:embeddedFont>
       <p:font typeface="Open Sans" panose="020B0606030504020204" pitchFamily="34" charset="0"/>
-      <p:regular r:id="rId23"/>
-      <p:bold r:id="rId24"/>
-      <p:italic r:id="rId25"/>
-      <p:boldItalic r:id="rId26"/>
+      <p:regular r:id="rId22"/>
+      <p:bold r:id="rId23"/>
+      <p:italic r:id="rId24"/>
+      <p:boldItalic r:id="rId25"/>
     </p:embeddedFont>
   </p:embeddedFontLst>
   <p:defaultTextStyle>
@@ -938,7 +937,7 @@
     </p:spTree>
     <p:extLst>
       <p:ext uri="{BB962C8B-B14F-4D97-AF65-F5344CB8AC3E}">
-        <p14:creationId xmlns:p14="http://schemas.microsoft.com/office/powerpoint/2010/main" val="1742725197"/>
+        <p14:creationId xmlns:p14="http://schemas.microsoft.com/office/powerpoint/2010/main" val="3237750179"/>
       </p:ext>
     </p:extLst>
   </p:cSld>
@@ -949,115 +948,6 @@
 </file>
 
 <file path=ppt/notesSlides/notesSlide11.xml><?xml version="1.0" encoding="utf-8"?>
-<p:notes xmlns:a="http://schemas.openxmlformats.org/drawingml/2006/main" xmlns:r="http://schemas.openxmlformats.org/officeDocument/2006/relationships" xmlns:p="http://schemas.openxmlformats.org/presentationml/2006/main" showMasterSp="0" showMasterPhAnim="0">
-  <p:cSld>
-    <p:spTree>
-      <p:nvGrpSpPr>
-        <p:cNvPr id="1" name="Shape 74"/>
-        <p:cNvGrpSpPr/>
-        <p:nvPr/>
-      </p:nvGrpSpPr>
-      <p:grpSpPr>
-        <a:xfrm>
-          <a:off x="0" y="0"/>
-          <a:ext cx="0" cy="0"/>
-          <a:chOff x="0" y="0"/>
-          <a:chExt cx="0" cy="0"/>
-        </a:xfrm>
-      </p:grpSpPr>
-      <p:sp>
-        <p:nvSpPr>
-          <p:cNvPr id="75" name="Google Shape;75;gd5b15f0a3_5_26:notes"/>
-          <p:cNvSpPr>
-            <a:spLocks noGrp="1" noRot="1" noChangeAspect="1"/>
-          </p:cNvSpPr>
-          <p:nvPr>
-            <p:ph type="sldImg" idx="2"/>
-          </p:nvPr>
-        </p:nvSpPr>
-        <p:spPr>
-          <a:xfrm>
-            <a:off x="381000" y="685800"/>
-            <a:ext cx="6096000" cy="3429000"/>
-          </a:xfrm>
-          <a:custGeom>
-            <a:avLst/>
-            <a:gdLst/>
-            <a:ahLst/>
-            <a:cxnLst/>
-            <a:rect l="l" t="t" r="r" b="b"/>
-            <a:pathLst>
-              <a:path w="120000" h="120000" extrusionOk="0">
-                <a:moveTo>
-                  <a:pt x="0" y="0"/>
-                </a:moveTo>
-                <a:lnTo>
-                  <a:pt x="120000" y="0"/>
-                </a:lnTo>
-                <a:lnTo>
-                  <a:pt x="120000" y="120000"/>
-                </a:lnTo>
-                <a:lnTo>
-                  <a:pt x="0" y="120000"/>
-                </a:lnTo>
-                <a:close/>
-              </a:path>
-            </a:pathLst>
-          </a:custGeom>
-        </p:spPr>
-      </p:sp>
-      <p:sp>
-        <p:nvSpPr>
-          <p:cNvPr id="76" name="Google Shape;76;gd5b15f0a3_5_26:notes"/>
-          <p:cNvSpPr txBox="1">
-            <a:spLocks noGrp="1"/>
-          </p:cNvSpPr>
-          <p:nvPr>
-            <p:ph type="body" idx="1"/>
-          </p:nvPr>
-        </p:nvSpPr>
-        <p:spPr>
-          <a:xfrm>
-            <a:off x="685800" y="4343400"/>
-            <a:ext cx="5486400" cy="4114800"/>
-          </a:xfrm>
-          <a:prstGeom prst="rect">
-            <a:avLst/>
-          </a:prstGeom>
-        </p:spPr>
-        <p:txBody>
-          <a:bodyPr spcFirstLastPara="1" wrap="square" lIns="91425" tIns="91425" rIns="91425" bIns="91425" anchor="t" anchorCtr="0">
-            <a:noAutofit/>
-          </a:bodyPr>
-          <a:lstStyle/>
-          <a:p>
-            <a:pPr marL="0" lvl="0" indent="0" algn="l" rtl="0">
-              <a:spcBef>
-                <a:spcPts val="0"/>
-              </a:spcBef>
-              <a:spcAft>
-                <a:spcPts val="0"/>
-              </a:spcAft>
-              <a:buNone/>
-            </a:pPr>
-            <a:endParaRPr/>
-          </a:p>
-        </p:txBody>
-      </p:sp>
-    </p:spTree>
-    <p:extLst>
-      <p:ext uri="{BB962C8B-B14F-4D97-AF65-F5344CB8AC3E}">
-        <p14:creationId xmlns:p14="http://schemas.microsoft.com/office/powerpoint/2010/main" val="3237750179"/>
-      </p:ext>
-    </p:extLst>
-  </p:cSld>
-  <p:clrMapOvr>
-    <a:masterClrMapping/>
-  </p:clrMapOvr>
-</p:notes>
-</file>
-
-<file path=ppt/notesSlides/notesSlide12.xml><?xml version="1.0" encoding="utf-8"?>
 <p:notes xmlns:a="http://schemas.openxmlformats.org/drawingml/2006/main" xmlns:r="http://schemas.openxmlformats.org/officeDocument/2006/relationships" xmlns:p="http://schemas.openxmlformats.org/presentationml/2006/main" showMasterSp="0" showMasterPhAnim="0">
   <p:cSld>
     <p:spTree>
@@ -1582,7 +1472,7 @@
     </p:spTree>
     <p:extLst>
       <p:ext uri="{BB962C8B-B14F-4D97-AF65-F5344CB8AC3E}">
-        <p14:creationId xmlns:p14="http://schemas.microsoft.com/office/powerpoint/2010/main" val="455620903"/>
+        <p14:creationId xmlns:p14="http://schemas.microsoft.com/office/powerpoint/2010/main" val="1218653981"/>
       </p:ext>
     </p:extLst>
   </p:cSld>
@@ -1691,7 +1581,7 @@
     </p:spTree>
     <p:extLst>
       <p:ext uri="{BB962C8B-B14F-4D97-AF65-F5344CB8AC3E}">
-        <p14:creationId xmlns:p14="http://schemas.microsoft.com/office/powerpoint/2010/main" val="2871134272"/>
+        <p14:creationId xmlns:p14="http://schemas.microsoft.com/office/powerpoint/2010/main" val="4100904739"/>
       </p:ext>
     </p:extLst>
   </p:cSld>
@@ -1800,7 +1690,7 @@
     </p:spTree>
     <p:extLst>
       <p:ext uri="{BB962C8B-B14F-4D97-AF65-F5344CB8AC3E}">
-        <p14:creationId xmlns:p14="http://schemas.microsoft.com/office/powerpoint/2010/main" val="1218653981"/>
+        <p14:creationId xmlns:p14="http://schemas.microsoft.com/office/powerpoint/2010/main" val="706833312"/>
       </p:ext>
     </p:extLst>
   </p:cSld>
@@ -1909,7 +1799,7 @@
     </p:spTree>
     <p:extLst>
       <p:ext uri="{BB962C8B-B14F-4D97-AF65-F5344CB8AC3E}">
-        <p14:creationId xmlns:p14="http://schemas.microsoft.com/office/powerpoint/2010/main" val="4100904739"/>
+        <p14:creationId xmlns:p14="http://schemas.microsoft.com/office/powerpoint/2010/main" val="1742725197"/>
       </p:ext>
     </p:extLst>
   </p:cSld>
@@ -2018,7 +1908,7 @@
     </p:spTree>
     <p:extLst>
       <p:ext uri="{BB962C8B-B14F-4D97-AF65-F5344CB8AC3E}">
-        <p14:creationId xmlns:p14="http://schemas.microsoft.com/office/powerpoint/2010/main" val="706833312"/>
+        <p14:creationId xmlns:p14="http://schemas.microsoft.com/office/powerpoint/2010/main" val="3465728296"/>
       </p:ext>
     </p:extLst>
   </p:cSld>
@@ -6357,58 +6247,6 @@
           </a:p>
         </p:txBody>
       </p:sp>
-      <p:sp>
-        <p:nvSpPr>
-          <p:cNvPr id="73" name="Google Shape;73;p13"/>
-          <p:cNvSpPr txBox="1">
-            <a:spLocks noGrp="1"/>
-          </p:cNvSpPr>
-          <p:nvPr>
-            <p:ph type="subTitle" idx="1"/>
-          </p:nvPr>
-        </p:nvSpPr>
-        <p:spPr>
-          <a:xfrm>
-            <a:off x="2390267" y="3238450"/>
-            <a:ext cx="6331500" cy="1241700"/>
-          </a:xfrm>
-          <a:prstGeom prst="rect">
-            <a:avLst/>
-          </a:prstGeom>
-        </p:spPr>
-        <p:txBody>
-          <a:bodyPr spcFirstLastPara="1" wrap="square" lIns="91425" tIns="91425" rIns="91425" bIns="91425" anchor="b" anchorCtr="0">
-            <a:noAutofit/>
-          </a:bodyPr>
-          <a:lstStyle/>
-          <a:p>
-            <a:pPr marL="0" lvl="0" indent="0" algn="l" rtl="0">
-              <a:spcBef>
-                <a:spcPts val="0"/>
-              </a:spcBef>
-              <a:spcAft>
-                <a:spcPts val="0"/>
-              </a:spcAft>
-              <a:buNone/>
-            </a:pPr>
-            <a:r>
-              <a:rPr lang="vi" sz="2400">
-                <a:latin typeface="Open Sans"/>
-                <a:ea typeface="Open Sans"/>
-                <a:cs typeface="Open Sans"/>
-                <a:sym typeface="Open Sans"/>
-              </a:rPr>
-              <a:t>Hướng dẫn của Chip Heath và Dan Heath</a:t>
-            </a:r>
-            <a:endParaRPr sz="2400" b="1">
-              <a:latin typeface="Open Sans"/>
-              <a:ea typeface="Open Sans"/>
-              <a:cs typeface="Open Sans"/>
-              <a:sym typeface="Open Sans"/>
-            </a:endParaRPr>
-          </a:p>
-        </p:txBody>
-      </p:sp>
     </p:spTree>
   </p:cSld>
   <p:clrMapOvr>
@@ -6474,125 +6312,6 @@
                   <a:schemeClr val="dk1"/>
                 </a:solidFill>
               </a:rPr>
-              <a:t>Fact_leave_days</a:t>
-            </a:r>
-            <a:r>
-              <a:rPr lang="en-US" sz="2800" dirty="0">
-                <a:solidFill>
-                  <a:schemeClr val="dk1"/>
-                </a:solidFill>
-              </a:rPr>
-              <a:t> database design </a:t>
-            </a:r>
-            <a:endParaRPr sz="2800" dirty="0">
-              <a:latin typeface="Montserrat"/>
-              <a:ea typeface="Montserrat"/>
-              <a:cs typeface="Montserrat"/>
-              <a:sym typeface="Montserrat"/>
-            </a:endParaRPr>
-          </a:p>
-        </p:txBody>
-      </p:sp>
-      <p:pic>
-        <p:nvPicPr>
-          <p:cNvPr id="5" name="Picture 4" descr="A screenshot of a computer&#10;&#10;Description automatically generated">
-            <a:extLst>
-              <a:ext uri="{FF2B5EF4-FFF2-40B4-BE49-F238E27FC236}">
-                <a16:creationId xmlns:a16="http://schemas.microsoft.com/office/drawing/2014/main" id="{08437070-EC35-62EB-FF64-93D575D362AE}"/>
-              </a:ext>
-            </a:extLst>
-          </p:cNvPr>
-          <p:cNvPicPr>
-            <a:picLocks noChangeAspect="1"/>
-          </p:cNvPicPr>
-          <p:nvPr/>
-        </p:nvPicPr>
-        <p:blipFill>
-          <a:blip r:embed="rId3"/>
-          <a:stretch>
-            <a:fillRect/>
-          </a:stretch>
-        </p:blipFill>
-        <p:spPr>
-          <a:xfrm>
-            <a:off x="884248" y="768000"/>
-            <a:ext cx="5792216" cy="4208143"/>
-          </a:xfrm>
-          <a:prstGeom prst="rect">
-            <a:avLst/>
-          </a:prstGeom>
-        </p:spPr>
-      </p:pic>
-    </p:spTree>
-    <p:extLst>
-      <p:ext uri="{BB962C8B-B14F-4D97-AF65-F5344CB8AC3E}">
-        <p14:creationId xmlns:p14="http://schemas.microsoft.com/office/powerpoint/2010/main" val="1190604922"/>
-      </p:ext>
-    </p:extLst>
-  </p:cSld>
-  <p:clrMapOvr>
-    <a:masterClrMapping/>
-  </p:clrMapOvr>
-</p:sld>
-</file>
-
-<file path=ppt/slides/slide11.xml><?xml version="1.0" encoding="utf-8"?>
-<p:sld xmlns:a="http://schemas.openxmlformats.org/drawingml/2006/main" xmlns:r="http://schemas.openxmlformats.org/officeDocument/2006/relationships" xmlns:p="http://schemas.openxmlformats.org/presentationml/2006/main">
-  <p:cSld>
-    <p:spTree>
-      <p:nvGrpSpPr>
-        <p:cNvPr id="1" name="Shape 77"/>
-        <p:cNvGrpSpPr/>
-        <p:nvPr/>
-      </p:nvGrpSpPr>
-      <p:grpSpPr>
-        <a:xfrm>
-          <a:off x="0" y="0"/>
-          <a:ext cx="0" cy="0"/>
-          <a:chOff x="0" y="0"/>
-          <a:chExt cx="0" cy="0"/>
-        </a:xfrm>
-      </p:grpSpPr>
-      <p:sp>
-        <p:nvSpPr>
-          <p:cNvPr id="78" name="Google Shape;78;p14"/>
-          <p:cNvSpPr txBox="1">
-            <a:spLocks noGrp="1"/>
-          </p:cNvSpPr>
-          <p:nvPr>
-            <p:ph type="title" idx="4294967295"/>
-          </p:nvPr>
-        </p:nvSpPr>
-        <p:spPr>
-          <a:xfrm>
-            <a:off x="199598" y="0"/>
-            <a:ext cx="8944401" cy="768000"/>
-          </a:xfrm>
-          <a:prstGeom prst="rect">
-            <a:avLst/>
-          </a:prstGeom>
-        </p:spPr>
-        <p:txBody>
-          <a:bodyPr spcFirstLastPara="1" wrap="square" lIns="91425" tIns="91425" rIns="91425" bIns="91425" anchor="t" anchorCtr="0">
-            <a:noAutofit/>
-          </a:bodyPr>
-          <a:lstStyle/>
-          <a:p>
-            <a:pPr marL="0" lvl="0" indent="0" algn="l" rtl="0">
-              <a:spcBef>
-                <a:spcPts val="0"/>
-              </a:spcBef>
-              <a:spcAft>
-                <a:spcPts val="1600"/>
-              </a:spcAft>
-              <a:buNone/>
-            </a:pPr>
-            <a:r>
-              <a:rPr lang="en-US" sz="2800" dirty="0" err="1">
-                <a:solidFill>
-                  <a:schemeClr val="dk1"/>
-                </a:solidFill>
-              </a:rPr>
               <a:t>Fact_terminations</a:t>
             </a:r>
             <a:r>
@@ -6634,8 +6353,37 @@
         </p:blipFill>
         <p:spPr>
           <a:xfrm>
-            <a:off x="1406039" y="768000"/>
-            <a:ext cx="4789098" cy="4080913"/>
+            <a:off x="2098562" y="1326052"/>
+            <a:ext cx="4315685" cy="3677506"/>
+          </a:xfrm>
+          <a:prstGeom prst="rect">
+            <a:avLst/>
+          </a:prstGeom>
+        </p:spPr>
+      </p:pic>
+      <p:pic>
+        <p:nvPicPr>
+          <p:cNvPr id="2" name="Picture 1" descr="A screenshot of a computer&#10;&#10;Description automatically generated">
+            <a:extLst>
+              <a:ext uri="{FF2B5EF4-FFF2-40B4-BE49-F238E27FC236}">
+                <a16:creationId xmlns:a16="http://schemas.microsoft.com/office/drawing/2014/main" id="{EF8CBA56-E69C-7D9D-9159-AC7D19323C18}"/>
+              </a:ext>
+            </a:extLst>
+          </p:cNvPr>
+          <p:cNvPicPr>
+            <a:picLocks noChangeAspect="1"/>
+          </p:cNvPicPr>
+          <p:nvPr/>
+        </p:nvPicPr>
+        <p:blipFill rotWithShape="1">
+          <a:blip r:embed="rId4"/>
+          <a:srcRect t="78372" r="621" b="6549"/>
+          <a:stretch/>
+        </p:blipFill>
+        <p:spPr>
+          <a:xfrm>
+            <a:off x="444574" y="558052"/>
+            <a:ext cx="7530353" cy="638736"/>
           </a:xfrm>
           <a:prstGeom prst="rect">
             <a:avLst/>
@@ -6655,7 +6403,7 @@
 </p:sld>
 </file>
 
-<file path=ppt/slides/slide12.xml><?xml version="1.0" encoding="utf-8"?>
+<file path=ppt/slides/slide11.xml><?xml version="1.0" encoding="utf-8"?>
 <p:sld xmlns:a="http://schemas.openxmlformats.org/drawingml/2006/main" xmlns:r="http://schemas.openxmlformats.org/officeDocument/2006/relationships" xmlns:p="http://schemas.openxmlformats.org/presentationml/2006/main">
   <p:cSld>
     <p:bg>
@@ -7172,10 +6920,39 @@
       </p:sp>
       <p:pic>
         <p:nvPicPr>
-          <p:cNvPr id="4" name="Picture 3" descr="A screenshot of a computer&#10;&#10;Description automatically generated">
+          <p:cNvPr id="2" name="Picture 1" descr="A screenshot of a computer&#10;&#10;Description automatically generated">
             <a:extLst>
               <a:ext uri="{FF2B5EF4-FFF2-40B4-BE49-F238E27FC236}">
-                <a16:creationId xmlns:a16="http://schemas.microsoft.com/office/drawing/2014/main" id="{9A57039D-BCF8-5B3B-26E6-09B50B40E228}"/>
+                <a16:creationId xmlns:a16="http://schemas.microsoft.com/office/drawing/2014/main" id="{B3791BF7-2CA3-EFA2-1C87-E6496C77FA90}"/>
+              </a:ext>
+            </a:extLst>
+          </p:cNvPr>
+          <p:cNvPicPr>
+            <a:picLocks noChangeAspect="1"/>
+          </p:cNvPicPr>
+          <p:nvPr/>
+        </p:nvPicPr>
+        <p:blipFill rotWithShape="1">
+          <a:blip r:embed="rId3"/>
+          <a:srcRect l="1" t="11381" r="616" b="72766"/>
+          <a:stretch/>
+        </p:blipFill>
+        <p:spPr>
+          <a:xfrm>
+            <a:off x="470227" y="511829"/>
+            <a:ext cx="7530774" cy="671513"/>
+          </a:xfrm>
+          <a:prstGeom prst="rect">
+            <a:avLst/>
+          </a:prstGeom>
+        </p:spPr>
+      </p:pic>
+      <p:pic>
+        <p:nvPicPr>
+          <p:cNvPr id="5" name="Picture 4" descr="A screenshot of a computer&#10;&#10;Description automatically generated">
+            <a:extLst>
+              <a:ext uri="{FF2B5EF4-FFF2-40B4-BE49-F238E27FC236}">
+                <a16:creationId xmlns:a16="http://schemas.microsoft.com/office/drawing/2014/main" id="{11212F57-0A27-7540-1173-442BAFCDD6A2}"/>
               </a:ext>
             </a:extLst>
           </p:cNvPr>
@@ -7185,15 +6962,15 @@
           <p:nvPr/>
         </p:nvPicPr>
         <p:blipFill>
-          <a:blip r:embed="rId3"/>
+          <a:blip r:embed="rId4"/>
           <a:stretch>
             <a:fillRect/>
           </a:stretch>
         </p:blipFill>
         <p:spPr>
           <a:xfrm>
-            <a:off x="2248292" y="563291"/>
-            <a:ext cx="4647416" cy="4419601"/>
+            <a:off x="1880991" y="1279829"/>
+            <a:ext cx="4176909" cy="3757119"/>
           </a:xfrm>
           <a:prstGeom prst="rect">
             <a:avLst/>
@@ -7265,304 +7042,6 @@
               <a:buNone/>
             </a:pPr>
             <a:r>
-              <a:rPr lang="en-US" sz="2800" dirty="0">
-                <a:solidFill>
-                  <a:schemeClr val="dk1"/>
-                </a:solidFill>
-                <a:latin typeface="Montserrat"/>
-                <a:ea typeface="Montserrat"/>
-                <a:cs typeface="Montserrat"/>
-                <a:sym typeface="Montserrat"/>
-              </a:rPr>
-              <a:t>Diversity</a:t>
-            </a:r>
-            <a:r>
-              <a:rPr lang="en-US" sz="2800" dirty="0">
-                <a:solidFill>
-                  <a:schemeClr val="dk1"/>
-                </a:solidFill>
-              </a:rPr>
-              <a:t> database design </a:t>
-            </a:r>
-            <a:endParaRPr sz="2800" dirty="0">
-              <a:latin typeface="Montserrat"/>
-              <a:ea typeface="Montserrat"/>
-              <a:cs typeface="Montserrat"/>
-              <a:sym typeface="Montserrat"/>
-            </a:endParaRPr>
-          </a:p>
-        </p:txBody>
-      </p:sp>
-      <p:pic>
-        <p:nvPicPr>
-          <p:cNvPr id="3" name="Picture 2" descr="A screenshot of a computer&#10;&#10;Description automatically generated">
-            <a:extLst>
-              <a:ext uri="{FF2B5EF4-FFF2-40B4-BE49-F238E27FC236}">
-                <a16:creationId xmlns:a16="http://schemas.microsoft.com/office/drawing/2014/main" id="{EA510D29-6293-E3CD-0403-C6914AC50D06}"/>
-              </a:ext>
-            </a:extLst>
-          </p:cNvPr>
-          <p:cNvPicPr>
-            <a:picLocks noChangeAspect="1"/>
-          </p:cNvPicPr>
-          <p:nvPr/>
-        </p:nvPicPr>
-        <p:blipFill>
-          <a:blip r:embed="rId3"/>
-          <a:stretch>
-            <a:fillRect/>
-          </a:stretch>
-        </p:blipFill>
-        <p:spPr>
-          <a:xfrm>
-            <a:off x="591670" y="768000"/>
-            <a:ext cx="7577419" cy="4236076"/>
-          </a:xfrm>
-          <a:prstGeom prst="rect">
-            <a:avLst/>
-          </a:prstGeom>
-        </p:spPr>
-      </p:pic>
-      <p:sp>
-        <p:nvSpPr>
-          <p:cNvPr id="2" name="Rectangle 1">
-            <a:extLst>
-              <a:ext uri="{FF2B5EF4-FFF2-40B4-BE49-F238E27FC236}">
-                <a16:creationId xmlns:a16="http://schemas.microsoft.com/office/drawing/2014/main" id="{D53B8498-2057-2B16-4C7C-4460948E8447}"/>
-              </a:ext>
-            </a:extLst>
-          </p:cNvPr>
-          <p:cNvSpPr/>
-          <p:nvPr/>
-        </p:nvSpPr>
-        <p:spPr>
-          <a:xfrm>
-            <a:off x="591670" y="1956547"/>
-            <a:ext cx="7463118" cy="705970"/>
-          </a:xfrm>
-          <a:prstGeom prst="rect">
-            <a:avLst/>
-          </a:prstGeom>
-          <a:noFill/>
-          <a:ln>
-            <a:solidFill>
-              <a:srgbClr val="FF0000"/>
-            </a:solidFill>
-          </a:ln>
-        </p:spPr>
-        <p:style>
-          <a:lnRef idx="2">
-            <a:schemeClr val="accent1">
-              <a:shade val="15000"/>
-            </a:schemeClr>
-          </a:lnRef>
-          <a:fillRef idx="1">
-            <a:schemeClr val="accent1"/>
-          </a:fillRef>
-          <a:effectRef idx="0">
-            <a:schemeClr val="accent1"/>
-          </a:effectRef>
-          <a:fontRef idx="minor">
-            <a:schemeClr val="lt1"/>
-          </a:fontRef>
-        </p:style>
-        <p:txBody>
-          <a:bodyPr rtlCol="0" anchor="ctr"/>
-          <a:lstStyle/>
-          <a:p>
-            <a:pPr algn="ctr"/>
-            <a:endParaRPr lang="en-US"/>
-          </a:p>
-        </p:txBody>
-      </p:sp>
-    </p:spTree>
-    <p:extLst>
-      <p:ext uri="{BB962C8B-B14F-4D97-AF65-F5344CB8AC3E}">
-        <p14:creationId xmlns:p14="http://schemas.microsoft.com/office/powerpoint/2010/main" val="3615804066"/>
-      </p:ext>
-    </p:extLst>
-  </p:cSld>
-  <p:clrMapOvr>
-    <a:masterClrMapping/>
-  </p:clrMapOvr>
-</p:sld>
-</file>
-
-<file path=ppt/slides/slide6.xml><?xml version="1.0" encoding="utf-8"?>
-<p:sld xmlns:a="http://schemas.openxmlformats.org/drawingml/2006/main" xmlns:r="http://schemas.openxmlformats.org/officeDocument/2006/relationships" xmlns:p="http://schemas.openxmlformats.org/presentationml/2006/main">
-  <p:cSld>
-    <p:spTree>
-      <p:nvGrpSpPr>
-        <p:cNvPr id="1" name="Shape 77"/>
-        <p:cNvGrpSpPr/>
-        <p:nvPr/>
-      </p:nvGrpSpPr>
-      <p:grpSpPr>
-        <a:xfrm>
-          <a:off x="0" y="0"/>
-          <a:ext cx="0" cy="0"/>
-          <a:chOff x="0" y="0"/>
-          <a:chExt cx="0" cy="0"/>
-        </a:xfrm>
-      </p:grpSpPr>
-      <p:sp>
-        <p:nvSpPr>
-          <p:cNvPr id="78" name="Google Shape;78;p14"/>
-          <p:cNvSpPr txBox="1">
-            <a:spLocks noGrp="1"/>
-          </p:cNvSpPr>
-          <p:nvPr>
-            <p:ph type="title" idx="4294967295"/>
-          </p:nvPr>
-        </p:nvSpPr>
-        <p:spPr>
-          <a:xfrm>
-            <a:off x="199598" y="0"/>
-            <a:ext cx="8944401" cy="768000"/>
-          </a:xfrm>
-          <a:prstGeom prst="rect">
-            <a:avLst/>
-          </a:prstGeom>
-        </p:spPr>
-        <p:txBody>
-          <a:bodyPr spcFirstLastPara="1" wrap="square" lIns="91425" tIns="91425" rIns="91425" bIns="91425" anchor="t" anchorCtr="0">
-            <a:noAutofit/>
-          </a:bodyPr>
-          <a:lstStyle/>
-          <a:p>
-            <a:pPr marL="0" lvl="0" indent="0" algn="l" rtl="0">
-              <a:spcBef>
-                <a:spcPts val="0"/>
-              </a:spcBef>
-              <a:spcAft>
-                <a:spcPts val="1600"/>
-              </a:spcAft>
-              <a:buNone/>
-            </a:pPr>
-            <a:r>
-              <a:rPr lang="en-US" sz="2800" dirty="0">
-                <a:solidFill>
-                  <a:schemeClr val="dk1"/>
-                </a:solidFill>
-                <a:latin typeface="Montserrat"/>
-                <a:ea typeface="Montserrat"/>
-                <a:cs typeface="Montserrat"/>
-                <a:sym typeface="Montserrat"/>
-              </a:rPr>
-              <a:t>Diversity</a:t>
-            </a:r>
-            <a:r>
-              <a:rPr lang="en-US" sz="2800" dirty="0">
-                <a:solidFill>
-                  <a:schemeClr val="dk1"/>
-                </a:solidFill>
-              </a:rPr>
-              <a:t> database design </a:t>
-            </a:r>
-            <a:endParaRPr sz="2800" dirty="0">
-              <a:latin typeface="Montserrat"/>
-              <a:ea typeface="Montserrat"/>
-              <a:cs typeface="Montserrat"/>
-              <a:sym typeface="Montserrat"/>
-            </a:endParaRPr>
-          </a:p>
-        </p:txBody>
-      </p:sp>
-      <p:pic>
-        <p:nvPicPr>
-          <p:cNvPr id="5" name="Picture 4" descr="A screenshot of a computer&#10;&#10;Description automatically generated">
-            <a:extLst>
-              <a:ext uri="{FF2B5EF4-FFF2-40B4-BE49-F238E27FC236}">
-                <a16:creationId xmlns:a16="http://schemas.microsoft.com/office/drawing/2014/main" id="{64FCB58F-FE5E-BAD4-4689-2D5B8EC43A09}"/>
-              </a:ext>
-            </a:extLst>
-          </p:cNvPr>
-          <p:cNvPicPr>
-            <a:picLocks noChangeAspect="1"/>
-          </p:cNvPicPr>
-          <p:nvPr/>
-        </p:nvPicPr>
-        <p:blipFill>
-          <a:blip r:embed="rId3"/>
-          <a:stretch>
-            <a:fillRect/>
-          </a:stretch>
-        </p:blipFill>
-        <p:spPr>
-          <a:xfrm>
-            <a:off x="964457" y="509622"/>
-            <a:ext cx="6075078" cy="4472514"/>
-          </a:xfrm>
-          <a:prstGeom prst="rect">
-            <a:avLst/>
-          </a:prstGeom>
-        </p:spPr>
-      </p:pic>
-    </p:spTree>
-    <p:extLst>
-      <p:ext uri="{BB962C8B-B14F-4D97-AF65-F5344CB8AC3E}">
-        <p14:creationId xmlns:p14="http://schemas.microsoft.com/office/powerpoint/2010/main" val="3357070015"/>
-      </p:ext>
-    </p:extLst>
-  </p:cSld>
-  <p:clrMapOvr>
-    <a:masterClrMapping/>
-  </p:clrMapOvr>
-</p:sld>
-</file>
-
-<file path=ppt/slides/slide7.xml><?xml version="1.0" encoding="utf-8"?>
-<p:sld xmlns:a="http://schemas.openxmlformats.org/drawingml/2006/main" xmlns:r="http://schemas.openxmlformats.org/officeDocument/2006/relationships" xmlns:p="http://schemas.openxmlformats.org/presentationml/2006/main">
-  <p:cSld>
-    <p:spTree>
-      <p:nvGrpSpPr>
-        <p:cNvPr id="1" name="Shape 77"/>
-        <p:cNvGrpSpPr/>
-        <p:nvPr/>
-      </p:nvGrpSpPr>
-      <p:grpSpPr>
-        <a:xfrm>
-          <a:off x="0" y="0"/>
-          <a:ext cx="0" cy="0"/>
-          <a:chOff x="0" y="0"/>
-          <a:chExt cx="0" cy="0"/>
-        </a:xfrm>
-      </p:grpSpPr>
-      <p:sp>
-        <p:nvSpPr>
-          <p:cNvPr id="78" name="Google Shape;78;p14"/>
-          <p:cNvSpPr txBox="1">
-            <a:spLocks noGrp="1"/>
-          </p:cNvSpPr>
-          <p:nvPr>
-            <p:ph type="title" idx="4294967295"/>
-          </p:nvPr>
-        </p:nvSpPr>
-        <p:spPr>
-          <a:xfrm>
-            <a:off x="199598" y="0"/>
-            <a:ext cx="8944401" cy="768000"/>
-          </a:xfrm>
-          <a:prstGeom prst="rect">
-            <a:avLst/>
-          </a:prstGeom>
-        </p:spPr>
-        <p:txBody>
-          <a:bodyPr spcFirstLastPara="1" wrap="square" lIns="91425" tIns="91425" rIns="91425" bIns="91425" anchor="t" anchorCtr="0">
-            <a:noAutofit/>
-          </a:bodyPr>
-          <a:lstStyle/>
-          <a:p>
-            <a:pPr marL="0" lvl="0" indent="0" algn="l" rtl="0">
-              <a:spcBef>
-                <a:spcPts val="0"/>
-              </a:spcBef>
-              <a:spcAft>
-                <a:spcPts val="1600"/>
-              </a:spcAft>
-              <a:buNone/>
-            </a:pPr>
-            <a:r>
               <a:rPr lang="en-US" sz="2800" dirty="0" err="1">
                 <a:solidFill>
                   <a:schemeClr val="dk1"/>
@@ -7682,6 +7161,325 @@
 </p:sld>
 </file>
 
+<file path=ppt/slides/slide6.xml><?xml version="1.0" encoding="utf-8"?>
+<p:sld xmlns:a="http://schemas.openxmlformats.org/drawingml/2006/main" xmlns:r="http://schemas.openxmlformats.org/officeDocument/2006/relationships" xmlns:p="http://schemas.openxmlformats.org/presentationml/2006/main">
+  <p:cSld>
+    <p:spTree>
+      <p:nvGrpSpPr>
+        <p:cNvPr id="1" name="Shape 77"/>
+        <p:cNvGrpSpPr/>
+        <p:nvPr/>
+      </p:nvGrpSpPr>
+      <p:grpSpPr>
+        <a:xfrm>
+          <a:off x="0" y="0"/>
+          <a:ext cx="0" cy="0"/>
+          <a:chOff x="0" y="0"/>
+          <a:chExt cx="0" cy="0"/>
+        </a:xfrm>
+      </p:grpSpPr>
+      <p:sp>
+        <p:nvSpPr>
+          <p:cNvPr id="78" name="Google Shape;78;p14"/>
+          <p:cNvSpPr txBox="1">
+            <a:spLocks noGrp="1"/>
+          </p:cNvSpPr>
+          <p:nvPr>
+            <p:ph type="title" idx="4294967295"/>
+          </p:nvPr>
+        </p:nvSpPr>
+        <p:spPr>
+          <a:xfrm>
+            <a:off x="199598" y="0"/>
+            <a:ext cx="8944401" cy="768000"/>
+          </a:xfrm>
+          <a:prstGeom prst="rect">
+            <a:avLst/>
+          </a:prstGeom>
+        </p:spPr>
+        <p:txBody>
+          <a:bodyPr spcFirstLastPara="1" wrap="square" lIns="91425" tIns="91425" rIns="91425" bIns="91425" anchor="t" anchorCtr="0">
+            <a:noAutofit/>
+          </a:bodyPr>
+          <a:lstStyle/>
+          <a:p>
+            <a:pPr marL="0" lvl="0" indent="0" algn="l" rtl="0">
+              <a:spcBef>
+                <a:spcPts val="0"/>
+              </a:spcBef>
+              <a:spcAft>
+                <a:spcPts val="1600"/>
+              </a:spcAft>
+              <a:buNone/>
+            </a:pPr>
+            <a:r>
+              <a:rPr lang="en-US" sz="2800" dirty="0" err="1">
+                <a:solidFill>
+                  <a:schemeClr val="dk1"/>
+                </a:solidFill>
+              </a:rPr>
+              <a:t>Fact_hiring</a:t>
+            </a:r>
+            <a:r>
+              <a:rPr lang="en-US" sz="2800" dirty="0">
+                <a:solidFill>
+                  <a:schemeClr val="dk1"/>
+                </a:solidFill>
+              </a:rPr>
+              <a:t> database design </a:t>
+            </a:r>
+            <a:endParaRPr sz="2800" dirty="0">
+              <a:latin typeface="Montserrat"/>
+              <a:ea typeface="Montserrat"/>
+              <a:cs typeface="Montserrat"/>
+              <a:sym typeface="Montserrat"/>
+            </a:endParaRPr>
+          </a:p>
+        </p:txBody>
+      </p:sp>
+      <p:pic>
+        <p:nvPicPr>
+          <p:cNvPr id="2" name="Picture 1" descr="A screenshot of a computer&#10;&#10;Description automatically generated">
+            <a:extLst>
+              <a:ext uri="{FF2B5EF4-FFF2-40B4-BE49-F238E27FC236}">
+                <a16:creationId xmlns:a16="http://schemas.microsoft.com/office/drawing/2014/main" id="{586977CB-5D7F-58C9-CBF6-55D4C42FEF7F}"/>
+              </a:ext>
+            </a:extLst>
+          </p:cNvPr>
+          <p:cNvPicPr>
+            <a:picLocks noChangeAspect="1"/>
+          </p:cNvPicPr>
+          <p:nvPr/>
+        </p:nvPicPr>
+        <p:blipFill rotWithShape="1">
+          <a:blip r:embed="rId3"/>
+          <a:srcRect t="44529" r="3887" b="37341"/>
+          <a:stretch/>
+        </p:blipFill>
+        <p:spPr>
+          <a:xfrm>
+            <a:off x="450476" y="524773"/>
+            <a:ext cx="7282903" cy="768000"/>
+          </a:xfrm>
+          <a:prstGeom prst="rect">
+            <a:avLst/>
+          </a:prstGeom>
+        </p:spPr>
+      </p:pic>
+      <p:pic>
+        <p:nvPicPr>
+          <p:cNvPr id="4" name="Picture 3" descr="A screenshot of a computer&#10;&#10;Description automatically generated">
+            <a:extLst>
+              <a:ext uri="{FF2B5EF4-FFF2-40B4-BE49-F238E27FC236}">
+                <a16:creationId xmlns:a16="http://schemas.microsoft.com/office/drawing/2014/main" id="{2E6BAC5D-69F4-B256-6D4C-D743CC642B44}"/>
+              </a:ext>
+            </a:extLst>
+          </p:cNvPr>
+          <p:cNvPicPr>
+            <a:picLocks noChangeAspect="1"/>
+          </p:cNvPicPr>
+          <p:nvPr/>
+        </p:nvPicPr>
+        <p:blipFill>
+          <a:blip r:embed="rId4"/>
+          <a:stretch>
+            <a:fillRect/>
+          </a:stretch>
+        </p:blipFill>
+        <p:spPr>
+          <a:xfrm>
+            <a:off x="1149103" y="1470373"/>
+            <a:ext cx="6145925" cy="3599517"/>
+          </a:xfrm>
+          <a:prstGeom prst="rect">
+            <a:avLst/>
+          </a:prstGeom>
+        </p:spPr>
+      </p:pic>
+    </p:spTree>
+    <p:extLst>
+      <p:ext uri="{BB962C8B-B14F-4D97-AF65-F5344CB8AC3E}">
+        <p14:creationId xmlns:p14="http://schemas.microsoft.com/office/powerpoint/2010/main" val="4147494569"/>
+      </p:ext>
+    </p:extLst>
+  </p:cSld>
+  <p:clrMapOvr>
+    <a:masterClrMapping/>
+  </p:clrMapOvr>
+</p:sld>
+</file>
+
+<file path=ppt/slides/slide7.xml><?xml version="1.0" encoding="utf-8"?>
+<p:sld xmlns:a="http://schemas.openxmlformats.org/drawingml/2006/main" xmlns:r="http://schemas.openxmlformats.org/officeDocument/2006/relationships" xmlns:p="http://schemas.openxmlformats.org/presentationml/2006/main">
+  <p:cSld>
+    <p:spTree>
+      <p:nvGrpSpPr>
+        <p:cNvPr id="1" name="Shape 77"/>
+        <p:cNvGrpSpPr/>
+        <p:nvPr/>
+      </p:nvGrpSpPr>
+      <p:grpSpPr>
+        <a:xfrm>
+          <a:off x="0" y="0"/>
+          <a:ext cx="0" cy="0"/>
+          <a:chOff x="0" y="0"/>
+          <a:chExt cx="0" cy="0"/>
+        </a:xfrm>
+      </p:grpSpPr>
+      <p:sp>
+        <p:nvSpPr>
+          <p:cNvPr id="78" name="Google Shape;78;p14"/>
+          <p:cNvSpPr txBox="1">
+            <a:spLocks noGrp="1"/>
+          </p:cNvSpPr>
+          <p:nvPr>
+            <p:ph type="title" idx="4294967295"/>
+          </p:nvPr>
+        </p:nvSpPr>
+        <p:spPr>
+          <a:xfrm>
+            <a:off x="199598" y="0"/>
+            <a:ext cx="8944401" cy="768000"/>
+          </a:xfrm>
+          <a:prstGeom prst="rect">
+            <a:avLst/>
+          </a:prstGeom>
+        </p:spPr>
+        <p:txBody>
+          <a:bodyPr spcFirstLastPara="1" wrap="square" lIns="91425" tIns="91425" rIns="91425" bIns="91425" anchor="t" anchorCtr="0">
+            <a:noAutofit/>
+          </a:bodyPr>
+          <a:lstStyle/>
+          <a:p>
+            <a:pPr marL="0" lvl="0" indent="0" algn="l" rtl="0">
+              <a:spcBef>
+                <a:spcPts val="0"/>
+              </a:spcBef>
+              <a:spcAft>
+                <a:spcPts val="1600"/>
+              </a:spcAft>
+              <a:buNone/>
+            </a:pPr>
+            <a:r>
+              <a:rPr lang="en-US" sz="2800" dirty="0" err="1">
+                <a:solidFill>
+                  <a:schemeClr val="dk1"/>
+                </a:solidFill>
+              </a:rPr>
+              <a:t>Fact_leave_days</a:t>
+            </a:r>
+            <a:r>
+              <a:rPr lang="en-US" sz="2800" dirty="0">
+                <a:solidFill>
+                  <a:schemeClr val="dk1"/>
+                </a:solidFill>
+              </a:rPr>
+              <a:t> database design </a:t>
+            </a:r>
+            <a:endParaRPr sz="2800" dirty="0">
+              <a:latin typeface="Montserrat"/>
+              <a:ea typeface="Montserrat"/>
+              <a:cs typeface="Montserrat"/>
+              <a:sym typeface="Montserrat"/>
+            </a:endParaRPr>
+          </a:p>
+        </p:txBody>
+      </p:sp>
+      <p:pic>
+        <p:nvPicPr>
+          <p:cNvPr id="3" name="Picture 2" descr="A screenshot of a computer&#10;&#10;Description automatically generated">
+            <a:extLst>
+              <a:ext uri="{FF2B5EF4-FFF2-40B4-BE49-F238E27FC236}">
+                <a16:creationId xmlns:a16="http://schemas.microsoft.com/office/drawing/2014/main" id="{EA510D29-6293-E3CD-0403-C6914AC50D06}"/>
+              </a:ext>
+            </a:extLst>
+          </p:cNvPr>
+          <p:cNvPicPr>
+            <a:picLocks noChangeAspect="1"/>
+          </p:cNvPicPr>
+          <p:nvPr/>
+        </p:nvPicPr>
+        <p:blipFill>
+          <a:blip r:embed="rId3"/>
+          <a:stretch>
+            <a:fillRect/>
+          </a:stretch>
+        </p:blipFill>
+        <p:spPr>
+          <a:xfrm>
+            <a:off x="591670" y="768000"/>
+            <a:ext cx="7577419" cy="4236076"/>
+          </a:xfrm>
+          <a:prstGeom prst="rect">
+            <a:avLst/>
+          </a:prstGeom>
+        </p:spPr>
+      </p:pic>
+      <p:sp>
+        <p:nvSpPr>
+          <p:cNvPr id="2" name="Rectangle 1">
+            <a:extLst>
+              <a:ext uri="{FF2B5EF4-FFF2-40B4-BE49-F238E27FC236}">
+                <a16:creationId xmlns:a16="http://schemas.microsoft.com/office/drawing/2014/main" id="{D53B8498-2057-2B16-4C7C-4460948E8447}"/>
+              </a:ext>
+            </a:extLst>
+          </p:cNvPr>
+          <p:cNvSpPr/>
+          <p:nvPr/>
+        </p:nvSpPr>
+        <p:spPr>
+          <a:xfrm>
+            <a:off x="648820" y="3395382"/>
+            <a:ext cx="7463118" cy="705970"/>
+          </a:xfrm>
+          <a:prstGeom prst="rect">
+            <a:avLst/>
+          </a:prstGeom>
+          <a:noFill/>
+          <a:ln>
+            <a:solidFill>
+              <a:srgbClr val="FF0000"/>
+            </a:solidFill>
+          </a:ln>
+        </p:spPr>
+        <p:style>
+          <a:lnRef idx="2">
+            <a:schemeClr val="accent1">
+              <a:shade val="15000"/>
+            </a:schemeClr>
+          </a:lnRef>
+          <a:fillRef idx="1">
+            <a:schemeClr val="accent1"/>
+          </a:fillRef>
+          <a:effectRef idx="0">
+            <a:schemeClr val="accent1"/>
+          </a:effectRef>
+          <a:fontRef idx="minor">
+            <a:schemeClr val="lt1"/>
+          </a:fontRef>
+        </p:style>
+        <p:txBody>
+          <a:bodyPr rtlCol="0" anchor="ctr"/>
+          <a:lstStyle/>
+          <a:p>
+            <a:pPr algn="ctr"/>
+            <a:endParaRPr lang="en-US"/>
+          </a:p>
+        </p:txBody>
+      </p:sp>
+    </p:spTree>
+    <p:extLst>
+      <p:ext uri="{BB962C8B-B14F-4D97-AF65-F5344CB8AC3E}">
+        <p14:creationId xmlns:p14="http://schemas.microsoft.com/office/powerpoint/2010/main" val="923215772"/>
+      </p:ext>
+    </p:extLst>
+  </p:cSld>
+  <p:clrMapOvr>
+    <a:masterClrMapping/>
+  </p:clrMapOvr>
+</p:sld>
+</file>
+
 <file path=ppt/slides/slide8.xml><?xml version="1.0" encoding="utf-8"?>
 <p:sld xmlns:a="http://schemas.openxmlformats.org/drawingml/2006/main" xmlns:r="http://schemas.openxmlformats.org/officeDocument/2006/relationships" xmlns:p="http://schemas.openxmlformats.org/presentationml/2006/main">
   <p:cSld>
@@ -7739,7 +7537,7 @@
                   <a:schemeClr val="dk1"/>
                 </a:solidFill>
               </a:rPr>
-              <a:t>Fact_hiring</a:t>
+              <a:t>Fact_leave_days</a:t>
             </a:r>
             <a:r>
               <a:rPr lang="en-US" sz="2800" dirty="0">
@@ -7760,10 +7558,39 @@
       </p:sp>
       <p:pic>
         <p:nvPicPr>
-          <p:cNvPr id="5" name="Picture 4" descr="A screenshot of a computer&#10;&#10;Description automatically generated">
+          <p:cNvPr id="2" name="Picture 1" descr="A screenshot of a computer&#10;&#10;Description automatically generated">
             <a:extLst>
               <a:ext uri="{FF2B5EF4-FFF2-40B4-BE49-F238E27FC236}">
-                <a16:creationId xmlns:a16="http://schemas.microsoft.com/office/drawing/2014/main" id="{90564A07-34D1-6CCE-2A03-C7838A1B11AF}"/>
+                <a16:creationId xmlns:a16="http://schemas.microsoft.com/office/drawing/2014/main" id="{B48BCD01-486E-66BC-A0EB-2566C69213F3}"/>
+              </a:ext>
+            </a:extLst>
+          </p:cNvPr>
+          <p:cNvPicPr>
+            <a:picLocks noChangeAspect="1"/>
+          </p:cNvPicPr>
+          <p:nvPr/>
+        </p:nvPicPr>
+        <p:blipFill rotWithShape="1">
+          <a:blip r:embed="rId3"/>
+          <a:srcRect l="1" t="62500" r="88" b="22104"/>
+          <a:stretch/>
+        </p:blipFill>
+        <p:spPr>
+          <a:xfrm>
+            <a:off x="786652" y="611840"/>
+            <a:ext cx="7570695" cy="652183"/>
+          </a:xfrm>
+          <a:prstGeom prst="rect">
+            <a:avLst/>
+          </a:prstGeom>
+        </p:spPr>
+      </p:pic>
+      <p:pic>
+        <p:nvPicPr>
+          <p:cNvPr id="4" name="Picture 3" descr="A screenshot of a computer&#10;&#10;Description automatically generated">
+            <a:extLst>
+              <a:ext uri="{FF2B5EF4-FFF2-40B4-BE49-F238E27FC236}">
+                <a16:creationId xmlns:a16="http://schemas.microsoft.com/office/drawing/2014/main" id="{BB93991F-2AB7-BD45-BF2E-09DB8674C81C}"/>
               </a:ext>
             </a:extLst>
           </p:cNvPr>
@@ -7773,15 +7600,15 @@
           <p:nvPr/>
         </p:nvPicPr>
         <p:blipFill>
-          <a:blip r:embed="rId3"/>
+          <a:blip r:embed="rId4"/>
           <a:stretch>
             <a:fillRect/>
           </a:stretch>
         </p:blipFill>
         <p:spPr>
           <a:xfrm>
-            <a:off x="1269427" y="874733"/>
-            <a:ext cx="5518435" cy="3966208"/>
+            <a:off x="1987632" y="1583243"/>
+            <a:ext cx="4917434" cy="3257697"/>
           </a:xfrm>
           <a:prstGeom prst="rect">
             <a:avLst/>
@@ -7791,7 +7618,7 @@
     </p:spTree>
     <p:extLst>
       <p:ext uri="{BB962C8B-B14F-4D97-AF65-F5344CB8AC3E}">
-        <p14:creationId xmlns:p14="http://schemas.microsoft.com/office/powerpoint/2010/main" val="4147494569"/>
+        <p14:creationId xmlns:p14="http://schemas.microsoft.com/office/powerpoint/2010/main" val="1190604922"/>
       </p:ext>
     </p:extLst>
   </p:cSld>
@@ -7921,7 +7748,7 @@
         </p:nvSpPr>
         <p:spPr>
           <a:xfrm>
-            <a:off x="648820" y="3395382"/>
+            <a:off x="648820" y="4087905"/>
             <a:ext cx="7463118" cy="705970"/>
           </a:xfrm>
           <a:prstGeom prst="rect">
@@ -7962,7 +7789,7 @@
     </p:spTree>
     <p:extLst>
       <p:ext uri="{BB962C8B-B14F-4D97-AF65-F5344CB8AC3E}">
-        <p14:creationId xmlns:p14="http://schemas.microsoft.com/office/powerpoint/2010/main" val="923215772"/>
+        <p14:creationId xmlns:p14="http://schemas.microsoft.com/office/powerpoint/2010/main" val="1370719009"/>
       </p:ext>
     </p:extLst>
   </p:cSld>

</xml_diff>